<commit_message>
Developer Guide: further updates to Import Command sequence diagram
</commit_message>
<xml_diff>
--- a/docs/diagrams/ImportCommandSequenceDiagram.pptx
+++ b/docs/diagrams/ImportCommandSequenceDiagram.pptx
@@ -124,10 +124,6 @@
     </p:ext>
   </p:extLst>
 </p:presentation>
-</file>
-
-<file path=ppt/revisionInfo.xml><?xml version="1.0" encoding="utf-8"?>
-<p1510:revInfo xmlns:a="http://schemas.openxmlformats.org/drawingml/2006/main" xmlns:r="http://schemas.openxmlformats.org/officeDocument/2006/relationships" xmlns:p1510="http://schemas.microsoft.com/office/powerpoint/2015/10/main"/>
 </file>
 
 <file path=ppt/notesMasters/notesMaster1.xml><?xml version="1.0" encoding="utf-8"?>
@@ -3454,7 +3450,7 @@
         </p:nvSpPr>
         <p:spPr>
           <a:xfrm>
-            <a:off x="685800" y="1981200"/>
+            <a:off x="457200" y="2057400"/>
             <a:ext cx="7252956" cy="4000286"/>
           </a:xfrm>
           <a:prstGeom prst="roundRect">
@@ -3515,7 +3511,7 @@
         </p:nvSpPr>
         <p:spPr>
           <a:xfrm>
-            <a:off x="845045" y="2296546"/>
+            <a:off x="616445" y="2372746"/>
             <a:ext cx="1455629" cy="346760"/>
           </a:xfrm>
           <a:prstGeom prst="rect">
@@ -3582,7 +3578,7 @@
         </p:nvCxnSpPr>
         <p:spPr>
           <a:xfrm>
-            <a:off x="1572859" y="2660217"/>
+            <a:off x="1344259" y="2736417"/>
             <a:ext cx="0" cy="2597583"/>
           </a:xfrm>
           <a:prstGeom prst="line">
@@ -3619,8 +3615,8 @@
         </p:nvSpPr>
         <p:spPr>
           <a:xfrm>
-            <a:off x="1500851" y="3010911"/>
-            <a:ext cx="152400" cy="2780287"/>
+            <a:off x="1272250" y="3087111"/>
+            <a:ext cx="153087" cy="3466089"/>
           </a:xfrm>
           <a:prstGeom prst="rect">
             <a:avLst/>
@@ -3666,7 +3662,7 @@
         </p:nvSpPr>
         <p:spPr>
           <a:xfrm>
-            <a:off x="2743200" y="2179309"/>
+            <a:off x="2514600" y="2255509"/>
             <a:ext cx="1219200" cy="467684"/>
           </a:xfrm>
           <a:prstGeom prst="rect">
@@ -3736,7 +3732,7 @@
         </p:nvCxnSpPr>
         <p:spPr>
           <a:xfrm>
-            <a:off x="3356599" y="2663904"/>
+            <a:off x="3127999" y="2740104"/>
             <a:ext cx="0" cy="1695374"/>
           </a:xfrm>
           <a:prstGeom prst="line">
@@ -3773,7 +3769,7 @@
         </p:nvSpPr>
         <p:spPr>
           <a:xfrm>
-            <a:off x="3284590" y="3122096"/>
+            <a:off x="3055990" y="3198296"/>
             <a:ext cx="174929" cy="1129459"/>
           </a:xfrm>
           <a:prstGeom prst="rect">
@@ -3824,7 +3820,7 @@
         </p:nvSpPr>
         <p:spPr>
           <a:xfrm>
-            <a:off x="6221565" y="3312740"/>
+            <a:off x="5992965" y="3388940"/>
             <a:ext cx="1093635" cy="461538"/>
           </a:xfrm>
           <a:prstGeom prst="rect">
@@ -3900,7 +3896,7 @@
         </p:nvCxnSpPr>
         <p:spPr>
           <a:xfrm>
-            <a:off x="6772574" y="3774278"/>
+            <a:off x="6543974" y="3850478"/>
             <a:ext cx="0" cy="1940722"/>
           </a:xfrm>
           <a:prstGeom prst="line">
@@ -3937,7 +3933,7 @@
         </p:nvSpPr>
         <p:spPr>
           <a:xfrm>
-            <a:off x="6696374" y="3774278"/>
+            <a:off x="6467774" y="3850478"/>
             <a:ext cx="152400" cy="276003"/>
           </a:xfrm>
           <a:prstGeom prst="rect">
@@ -3984,7 +3980,7 @@
         </p:nvCxnSpPr>
         <p:spPr>
           <a:xfrm>
-            <a:off x="381000" y="3014599"/>
+            <a:off x="152400" y="3090799"/>
             <a:ext cx="1119851" cy="0"/>
           </a:xfrm>
           <a:prstGeom prst="straightConnector1">
@@ -4020,7 +4016,7 @@
         </p:nvCxnSpPr>
         <p:spPr>
           <a:xfrm flipV="1">
-            <a:off x="1653251" y="3122097"/>
+            <a:off x="1424651" y="3198297"/>
             <a:ext cx="1596514" cy="1"/>
           </a:xfrm>
           <a:prstGeom prst="straightConnector1">
@@ -4056,7 +4052,7 @@
         </p:nvSpPr>
         <p:spPr>
           <a:xfrm>
-            <a:off x="-290844" y="2795467"/>
+            <a:off x="-481820" y="2871667"/>
             <a:ext cx="1700169" cy="430887"/>
           </a:xfrm>
           <a:prstGeom prst="rect">
@@ -4101,7 +4097,7 @@
         </p:nvCxnSpPr>
         <p:spPr>
           <a:xfrm flipV="1">
-            <a:off x="5257218" y="3703214"/>
+            <a:off x="5028618" y="3779414"/>
             <a:ext cx="922392" cy="1"/>
           </a:xfrm>
           <a:prstGeom prst="straightConnector1">
@@ -4137,7 +4133,7 @@
         </p:nvSpPr>
         <p:spPr>
           <a:xfrm>
-            <a:off x="4257582" y="4251556"/>
+            <a:off x="4028982" y="4327756"/>
             <a:ext cx="855809" cy="215444"/>
           </a:xfrm>
           <a:prstGeom prst="rect">
@@ -4177,7 +4173,7 @@
         </p:nvCxnSpPr>
         <p:spPr>
           <a:xfrm>
-            <a:off x="5257800" y="4050281"/>
+            <a:off x="5029200" y="4126481"/>
             <a:ext cx="1492974" cy="0"/>
           </a:xfrm>
           <a:prstGeom prst="straightConnector1">
@@ -4215,7 +4211,7 @@
         </p:nvCxnSpPr>
         <p:spPr>
           <a:xfrm flipV="1">
-            <a:off x="1670186" y="4243231"/>
+            <a:off x="1441586" y="4319431"/>
             <a:ext cx="1596514" cy="5378"/>
           </a:xfrm>
           <a:prstGeom prst="straightConnector1">
@@ -4253,7 +4249,7 @@
         </p:nvCxnSpPr>
         <p:spPr>
           <a:xfrm>
-            <a:off x="304800" y="5791200"/>
+            <a:off x="76199" y="6553200"/>
             <a:ext cx="1196051" cy="0"/>
           </a:xfrm>
           <a:prstGeom prst="straightConnector1">
@@ -4291,7 +4287,7 @@
         </p:nvSpPr>
         <p:spPr>
           <a:xfrm>
-            <a:off x="8265896" y="2362200"/>
+            <a:off x="8018819" y="2091830"/>
             <a:ext cx="1030504" cy="346760"/>
           </a:xfrm>
           <a:prstGeom prst="rect">
@@ -4356,7 +4352,7 @@
         </p:nvCxnSpPr>
         <p:spPr>
           <a:xfrm>
-            <a:off x="1653251" y="4495317"/>
+            <a:off x="1424651" y="4571517"/>
             <a:ext cx="5043123" cy="0"/>
           </a:xfrm>
           <a:prstGeom prst="straightConnector1">
@@ -4392,8 +4388,8 @@
         </p:nvSpPr>
         <p:spPr>
           <a:xfrm>
-            <a:off x="6687451" y="4467000"/>
-            <a:ext cx="164103" cy="1248000"/>
+            <a:off x="6458851" y="4543199"/>
+            <a:ext cx="145875" cy="1790489"/>
           </a:xfrm>
           <a:custGeom>
             <a:avLst/>
@@ -4569,13 +4565,16 @@
       <p:cxnSp>
         <p:nvCxnSpPr>
           <p:cNvPr id="71" name="Straight Connector 70"/>
-          <p:cNvCxnSpPr/>
+          <p:cNvCxnSpPr>
+            <a:cxnSpLocks/>
+            <a:endCxn id="73" idx="0"/>
+          </p:cNvCxnSpPr>
           <p:nvPr/>
         </p:nvCxnSpPr>
         <p:spPr>
           <a:xfrm>
-            <a:off x="8781148" y="2700858"/>
-            <a:ext cx="0" cy="2830598"/>
+            <a:off x="8534071" y="2410408"/>
+            <a:ext cx="27759" cy="3010732"/>
           </a:xfrm>
           <a:prstGeom prst="line">
             <a:avLst/>
@@ -4614,8 +4613,8 @@
         </p:nvSpPr>
         <p:spPr>
           <a:xfrm>
-            <a:off x="8686800" y="4524597"/>
-            <a:ext cx="152400" cy="199803"/>
+            <a:off x="8485630" y="5421140"/>
+            <a:ext cx="152400" cy="98798"/>
           </a:xfrm>
           <a:prstGeom prst="rect">
             <a:avLst/>
@@ -4671,7 +4670,7 @@
         </p:nvCxnSpPr>
         <p:spPr>
           <a:xfrm>
-            <a:off x="7108963" y="3986327"/>
+            <a:off x="6658359" y="5432692"/>
             <a:ext cx="1836137" cy="0"/>
           </a:xfrm>
           <a:prstGeom prst="straightConnector1">
@@ -4702,13 +4701,16 @@
       <p:cxnSp>
         <p:nvCxnSpPr>
           <p:cNvPr id="76" name="Straight Arrow Connector 75"/>
-          <p:cNvCxnSpPr/>
+          <p:cNvCxnSpPr>
+            <a:cxnSpLocks/>
+            <a:endCxn id="73" idx="2"/>
+          </p:cNvCxnSpPr>
           <p:nvPr/>
         </p:nvCxnSpPr>
         <p:spPr>
-          <a:xfrm flipV="1">
-            <a:off x="7274617" y="3587755"/>
-            <a:ext cx="1838026" cy="9750"/>
+          <a:xfrm>
+            <a:off x="6691913" y="5517557"/>
+            <a:ext cx="1869917" cy="2381"/>
           </a:xfrm>
           <a:prstGeom prst="straightConnector1">
             <a:avLst/>
@@ -4748,7 +4750,7 @@
         </p:nvCxnSpPr>
         <p:spPr>
           <a:xfrm>
-            <a:off x="1653251" y="5486400"/>
+            <a:off x="1424651" y="6326068"/>
             <a:ext cx="5052349" cy="0"/>
           </a:xfrm>
           <a:prstGeom prst="straightConnector1">
@@ -4786,7 +4788,7 @@
         </p:nvSpPr>
         <p:spPr>
           <a:xfrm>
-            <a:off x="3847551" y="3657600"/>
+            <a:off x="3618951" y="3733800"/>
             <a:ext cx="1015833" cy="184666"/>
           </a:xfrm>
           <a:prstGeom prst="rect">
@@ -4826,7 +4828,7 @@
         </p:nvSpPr>
         <p:spPr>
           <a:xfrm>
-            <a:off x="1690207" y="2893701"/>
+            <a:off x="1461607" y="2969901"/>
             <a:ext cx="1424846" cy="430887"/>
           </a:xfrm>
           <a:prstGeom prst="rect">
@@ -4872,7 +4874,7 @@
         </p:nvSpPr>
         <p:spPr>
           <a:xfrm>
-            <a:off x="4340137" y="5255323"/>
+            <a:off x="3835670" y="6086209"/>
             <a:ext cx="621216" cy="215444"/>
           </a:xfrm>
           <a:prstGeom prst="rect">
@@ -4912,7 +4914,7 @@
         </p:nvSpPr>
         <p:spPr>
           <a:xfrm>
-            <a:off x="599983" y="5538488"/>
+            <a:off x="159534" y="6337756"/>
             <a:ext cx="762000" cy="215444"/>
           </a:xfrm>
           <a:prstGeom prst="rect">
@@ -4952,7 +4954,7 @@
         </p:nvSpPr>
         <p:spPr>
           <a:xfrm>
-            <a:off x="7045283" y="5408031"/>
+            <a:off x="7315200" y="5646356"/>
             <a:ext cx="1590354" cy="461538"/>
           </a:xfrm>
           <a:prstGeom prst="rect">
@@ -5013,98 +5015,13 @@
       </p:sp>
       <p:sp>
         <p:nvSpPr>
-          <p:cNvPr id="86" name="Rectangle 85"/>
-          <p:cNvSpPr/>
-          <p:nvPr/>
-        </p:nvSpPr>
-        <p:spPr>
-          <a:xfrm>
-            <a:off x="8166891" y="5141223"/>
-            <a:ext cx="152400" cy="171376"/>
-          </a:xfrm>
-          <a:prstGeom prst="rect">
-            <a:avLst/>
-          </a:prstGeom>
-          <a:solidFill>
-            <a:srgbClr val="0070C0"/>
-          </a:solidFill>
-          <a:ln>
-            <a:solidFill>
-              <a:srgbClr val="0070C0"/>
-            </a:solidFill>
-          </a:ln>
-          <a:effectLst/>
-        </p:spPr>
-        <p:style>
-          <a:lnRef idx="1">
-            <a:schemeClr val="accent3"/>
-          </a:lnRef>
-          <a:fillRef idx="2">
-            <a:schemeClr val="accent3"/>
-          </a:fillRef>
-          <a:effectRef idx="1">
-            <a:schemeClr val="accent3"/>
-          </a:effectRef>
-          <a:fontRef idx="minor">
-            <a:schemeClr val="dk1"/>
-          </a:fontRef>
-        </p:style>
-        <p:txBody>
-          <a:bodyPr rtlCol="0" anchor="ctr"/>
-          <a:lstStyle/>
-          <a:p>
-            <a:pPr algn="ctr"/>
-            <a:endParaRPr lang="en-SG" sz="1400"/>
-          </a:p>
-        </p:txBody>
-      </p:sp>
-      <p:cxnSp>
-        <p:nvCxnSpPr>
-          <p:cNvPr id="90" name="Straight Arrow Connector 89"/>
-          <p:cNvCxnSpPr/>
-          <p:nvPr/>
-        </p:nvCxnSpPr>
-        <p:spPr>
-          <a:xfrm>
-            <a:off x="7796047" y="5638800"/>
-            <a:ext cx="966624" cy="0"/>
-          </a:xfrm>
-          <a:prstGeom prst="straightConnector1">
-            <a:avLst/>
-          </a:prstGeom>
-          <a:ln w="19050">
-            <a:solidFill>
-              <a:srgbClr val="0070C0"/>
-            </a:solidFill>
-            <a:prstDash val="sysDash"/>
-            <a:headEnd type="arrow" w="med" len="med"/>
-            <a:tailEnd type="none" w="med" len="med"/>
-          </a:ln>
-        </p:spPr>
-        <p:style>
-          <a:lnRef idx="1">
-            <a:schemeClr val="accent1"/>
-          </a:lnRef>
-          <a:fillRef idx="0">
-            <a:schemeClr val="accent1"/>
-          </a:fillRef>
-          <a:effectRef idx="0">
-            <a:schemeClr val="accent1"/>
-          </a:effectRef>
-          <a:fontRef idx="minor">
-            <a:schemeClr val="tx1"/>
-          </a:fontRef>
-        </p:style>
-      </p:cxnSp>
-      <p:sp>
-        <p:nvSpPr>
           <p:cNvPr id="93" name="TextBox 92"/>
           <p:cNvSpPr txBox="1"/>
           <p:nvPr/>
         </p:nvSpPr>
         <p:spPr>
           <a:xfrm>
-            <a:off x="2673845" y="4027787"/>
+            <a:off x="2445245" y="4103987"/>
             <a:ext cx="220343" cy="215444"/>
           </a:xfrm>
           <a:prstGeom prst="rect">
@@ -5145,7 +5062,7 @@
         </p:nvSpPr>
         <p:spPr>
           <a:xfrm>
-            <a:off x="4231981" y="2929839"/>
+            <a:off x="4003381" y="3006039"/>
             <a:ext cx="1778201" cy="432035"/>
           </a:xfrm>
           <a:prstGeom prst="rect">
@@ -5228,7 +5145,7 @@
         </p:nvCxnSpPr>
         <p:spPr>
           <a:xfrm>
-            <a:off x="3462591" y="3657600"/>
+            <a:off x="3233991" y="3733800"/>
             <a:ext cx="1597356" cy="1"/>
           </a:xfrm>
           <a:prstGeom prst="straightConnector1">
@@ -5262,7 +5179,7 @@
         </p:nvSpPr>
         <p:spPr>
           <a:xfrm>
-            <a:off x="5059947" y="3352800"/>
+            <a:off x="4831347" y="3429000"/>
             <a:ext cx="205843" cy="123165"/>
           </a:xfrm>
           <a:prstGeom prst="rect">
@@ -5311,7 +5228,7 @@
         </p:nvCxnSpPr>
         <p:spPr>
           <a:xfrm>
-            <a:off x="5162869" y="3352800"/>
+            <a:off x="4934269" y="3429000"/>
             <a:ext cx="0" cy="990600"/>
           </a:xfrm>
           <a:prstGeom prst="line">
@@ -5348,7 +5265,7 @@
         </p:nvSpPr>
         <p:spPr>
           <a:xfrm>
-            <a:off x="5059947" y="3657601"/>
+            <a:off x="4831347" y="3733801"/>
             <a:ext cx="205843" cy="533400"/>
           </a:xfrm>
           <a:prstGeom prst="rect">
@@ -5395,7 +5312,7 @@
         </p:nvCxnSpPr>
         <p:spPr>
           <a:xfrm>
-            <a:off x="3499382" y="4185073"/>
+            <a:off x="3270782" y="4261273"/>
             <a:ext cx="1667219" cy="0"/>
           </a:xfrm>
           <a:prstGeom prst="straightConnector1">
@@ -5433,7 +5350,7 @@
         </p:nvCxnSpPr>
         <p:spPr>
           <a:xfrm>
-            <a:off x="3412425" y="3173004"/>
+            <a:off x="3183825" y="3249204"/>
             <a:ext cx="819556" cy="1"/>
           </a:xfrm>
           <a:prstGeom prst="straightConnector1">
@@ -5469,7 +5386,7 @@
         </p:nvCxnSpPr>
         <p:spPr>
           <a:xfrm>
-            <a:off x="3459519" y="3475965"/>
+            <a:off x="3230919" y="3552165"/>
             <a:ext cx="1600428" cy="0"/>
           </a:xfrm>
           <a:prstGeom prst="straightConnector1">
@@ -5507,7 +5424,7 @@
         </p:nvSpPr>
         <p:spPr>
           <a:xfrm>
-            <a:off x="5033665" y="4199590"/>
+            <a:off x="4805065" y="4275790"/>
             <a:ext cx="258404" cy="261610"/>
           </a:xfrm>
           <a:prstGeom prst="rect">
@@ -5546,7 +5463,7 @@
         </p:nvSpPr>
         <p:spPr>
           <a:xfrm>
-            <a:off x="6768113" y="4524375"/>
+            <a:off x="6539513" y="4600575"/>
             <a:ext cx="152400" cy="200025"/>
           </a:xfrm>
           <a:custGeom>
@@ -5676,12 +5593,12 @@
         </p:nvCxnSpPr>
         <p:spPr>
           <a:xfrm>
-            <a:off x="6848773" y="4467000"/>
-            <a:ext cx="71140" cy="57375"/>
+            <a:off x="6602254" y="4543199"/>
+            <a:ext cx="89059" cy="57376"/>
           </a:xfrm>
           <a:prstGeom prst="curvedConnector3">
             <a:avLst>
-              <a:gd name="adj1" fmla="val 422182"/>
+              <a:gd name="adj1" fmla="val 357357"/>
             </a:avLst>
           </a:prstGeom>
           <a:ln>
@@ -5717,8 +5634,8 @@
         </p:nvSpPr>
         <p:spPr>
           <a:xfrm>
-            <a:off x="7074638" y="4356283"/>
-            <a:ext cx="780714" cy="246221"/>
+            <a:off x="6846038" y="4432483"/>
+            <a:ext cx="780714" cy="200055"/>
           </a:xfrm>
           <a:prstGeom prst="rect">
             <a:avLst/>
@@ -5732,14 +5649,14 @@
           <a:lstStyle/>
           <a:p>
             <a:r>
-              <a:rPr lang="en-US" sz="1000" dirty="0">
+              <a:rPr lang="en-US" sz="700" dirty="0">
                 <a:solidFill>
                   <a:schemeClr val="tx2"/>
                 </a:solidFill>
               </a:rPr>
               <a:t>authorize()</a:t>
             </a:r>
-            <a:endParaRPr lang="en-SG" sz="1000" dirty="0">
+            <a:endParaRPr lang="en-SG" sz="700" dirty="0">
               <a:solidFill>
                 <a:schemeClr val="tx2"/>
               </a:solidFill>
@@ -5763,7 +5680,7 @@
         </p:nvCxnSpPr>
         <p:spPr>
           <a:xfrm flipH="1">
-            <a:off x="6846545" y="4722304"/>
+            <a:off x="6617945" y="4798504"/>
             <a:ext cx="68070" cy="53206"/>
           </a:xfrm>
           <a:prstGeom prst="curvedConnector3">
@@ -5804,8 +5721,8 @@
         </p:nvSpPr>
         <p:spPr>
           <a:xfrm>
-            <a:off x="7081587" y="4542549"/>
-            <a:ext cx="814224" cy="246221"/>
+            <a:off x="6845514" y="4707671"/>
+            <a:ext cx="814224" cy="200055"/>
           </a:xfrm>
           <a:prstGeom prst="rect">
             <a:avLst/>
@@ -5819,7 +5736,7 @@
           <a:lstStyle/>
           <a:p>
             <a:r>
-              <a:rPr lang="en-US" sz="1000" dirty="0">
+              <a:rPr lang="en-US" sz="700" dirty="0">
                 <a:solidFill>
                   <a:schemeClr val="tx2"/>
                 </a:solidFill>
@@ -5848,7 +5765,7 @@
         </p:nvSpPr>
         <p:spPr>
           <a:xfrm>
-            <a:off x="6767598" y="4897959"/>
+            <a:off x="6538998" y="4974159"/>
             <a:ext cx="152400" cy="200025"/>
           </a:xfrm>
           <a:custGeom>
@@ -5974,7 +5891,7 @@
         </p:nvCxnSpPr>
         <p:spPr>
           <a:xfrm>
-            <a:off x="6843798" y="4844753"/>
+            <a:off x="6615198" y="4920953"/>
             <a:ext cx="71140" cy="57375"/>
           </a:xfrm>
           <a:prstGeom prst="curvedConnector3">
@@ -6017,7 +5934,7 @@
         </p:nvCxnSpPr>
         <p:spPr>
           <a:xfrm flipH="1">
-            <a:off x="6850730" y="5096465"/>
+            <a:off x="6622130" y="5172665"/>
             <a:ext cx="68070" cy="53206"/>
           </a:xfrm>
           <a:prstGeom prst="curvedConnector3">
@@ -6058,8 +5975,8 @@
         </p:nvSpPr>
         <p:spPr>
           <a:xfrm>
-            <a:off x="7068539" y="4744639"/>
-            <a:ext cx="1654557" cy="246221"/>
+            <a:off x="6839939" y="4820839"/>
+            <a:ext cx="1654557" cy="200055"/>
           </a:xfrm>
           <a:prstGeom prst="rect">
             <a:avLst/>
@@ -6073,7 +5990,7 @@
           <a:lstStyle/>
           <a:p>
             <a:r>
-              <a:rPr lang="en-US" sz="1000" dirty="0" err="1">
+              <a:rPr lang="en-US" sz="700" dirty="0" err="1">
                 <a:solidFill>
                   <a:schemeClr val="tx2"/>
                 </a:solidFill>
@@ -6081,14 +5998,14 @@
               <a:t>retrieveContacts</a:t>
             </a:r>
             <a:r>
-              <a:rPr lang="en-US" sz="1000" dirty="0">
+              <a:rPr lang="en-US" sz="700" dirty="0">
                 <a:solidFill>
                   <a:schemeClr val="tx2"/>
                 </a:solidFill>
               </a:rPr>
               <a:t>(credential)</a:t>
             </a:r>
-            <a:endParaRPr lang="en-SG" sz="1000" dirty="0">
+            <a:endParaRPr lang="en-SG" sz="700" dirty="0">
               <a:solidFill>
                 <a:schemeClr val="tx2"/>
               </a:solidFill>
@@ -6110,8 +6027,8 @@
         </p:nvSpPr>
         <p:spPr>
           <a:xfrm>
-            <a:off x="7041128" y="4918585"/>
-            <a:ext cx="814224" cy="246221"/>
+            <a:off x="6632485" y="5007421"/>
+            <a:ext cx="814224" cy="200055"/>
           </a:xfrm>
           <a:prstGeom prst="rect">
             <a:avLst/>
@@ -6125,7 +6042,7 @@
           <a:lstStyle/>
           <a:p>
             <a:r>
-              <a:rPr lang="en-US" sz="1000" dirty="0">
+              <a:rPr lang="en-US" sz="700" dirty="0">
                 <a:solidFill>
                   <a:schemeClr val="tx2"/>
                 </a:solidFill>
@@ -6154,7 +6071,7 @@
         </p:nvSpPr>
         <p:spPr>
           <a:xfrm>
-            <a:off x="6765545" y="5265541"/>
+            <a:off x="6536945" y="5341741"/>
             <a:ext cx="152400" cy="200025"/>
           </a:xfrm>
           <a:custGeom>
@@ -6280,7 +6197,7 @@
         </p:nvCxnSpPr>
         <p:spPr>
           <a:xfrm>
-            <a:off x="6842593" y="5205346"/>
+            <a:off x="6613993" y="5281546"/>
             <a:ext cx="71140" cy="57375"/>
           </a:xfrm>
           <a:prstGeom prst="curvedConnector3">
@@ -6321,8 +6238,8 @@
         </p:nvSpPr>
         <p:spPr>
           <a:xfrm>
-            <a:off x="7068539" y="5094188"/>
-            <a:ext cx="1694132" cy="246221"/>
+            <a:off x="6839939" y="5147773"/>
+            <a:ext cx="1694132" cy="200055"/>
           </a:xfrm>
           <a:prstGeom prst="rect">
             <a:avLst/>
@@ -6336,7 +6253,7 @@
           <a:lstStyle/>
           <a:p>
             <a:r>
-              <a:rPr lang="en-US" sz="1000" dirty="0" err="1">
+              <a:rPr lang="en-US" sz="700" dirty="0" err="1">
                 <a:solidFill>
                   <a:schemeClr val="tx2"/>
                 </a:solidFill>
@@ -6344,13 +6261,65 @@
               <a:t>importContacts</a:t>
             </a:r>
             <a:r>
-              <a:rPr lang="en-US" sz="1000" dirty="0">
+              <a:rPr lang="en-US" sz="700" dirty="0">
                 <a:solidFill>
                   <a:schemeClr val="tx2"/>
                 </a:solidFill>
               </a:rPr>
               <a:t>(connections)</a:t>
             </a:r>
+            <a:endParaRPr lang="en-SG" sz="700" dirty="0">
+              <a:solidFill>
+                <a:schemeClr val="tx2"/>
+              </a:solidFill>
+            </a:endParaRPr>
+          </a:p>
+        </p:txBody>
+      </p:sp>
+      <p:sp>
+        <p:nvSpPr>
+          <p:cNvPr id="113" name="TextBox 112">
+            <a:extLst>
+              <a:ext uri="{FF2B5EF4-FFF2-40B4-BE49-F238E27FC236}">
+                <a16:creationId xmlns:a16="http://schemas.microsoft.com/office/drawing/2014/main" id="{79C82149-9DE4-46AD-B1D0-0AE1A9F5659D}"/>
+              </a:ext>
+            </a:extLst>
+          </p:cNvPr>
+          <p:cNvSpPr txBox="1"/>
+          <p:nvPr/>
+        </p:nvSpPr>
+        <p:spPr>
+          <a:xfrm>
+            <a:off x="7796376" y="5253795"/>
+            <a:ext cx="814224" cy="200055"/>
+          </a:xfrm>
+          <a:prstGeom prst="rect">
+            <a:avLst/>
+          </a:prstGeom>
+          <a:noFill/>
+        </p:spPr>
+        <p:txBody>
+          <a:bodyPr wrap="square" rtlCol="0">
+            <a:spAutoFit/>
+          </a:bodyPr>
+          <a:lstStyle/>
+          <a:p>
+            <a:r>
+              <a:rPr lang="en-US" sz="700" dirty="0" err="1">
+                <a:solidFill>
+                  <a:schemeClr val="tx2"/>
+                </a:solidFill>
+              </a:rPr>
+              <a:t>addPerson</a:t>
+            </a:r>
+            <a:r>
+              <a:rPr lang="en-US" sz="700" dirty="0">
+                <a:solidFill>
+                  <a:schemeClr val="tx2"/>
+                </a:solidFill>
+              </a:rPr>
+              <a:t>(p)</a:t>
+            </a:r>
             <a:endParaRPr lang="en-SG" sz="1000" dirty="0">
               <a:solidFill>
                 <a:schemeClr val="tx2"/>
@@ -6359,6 +6328,149 @@
           </a:p>
         </p:txBody>
       </p:sp>
+      <p:cxnSp>
+        <p:nvCxnSpPr>
+          <p:cNvPr id="114" name="Straight Arrow Connector 113">
+            <a:extLst>
+              <a:ext uri="{FF2B5EF4-FFF2-40B4-BE49-F238E27FC236}">
+                <a16:creationId xmlns:a16="http://schemas.microsoft.com/office/drawing/2014/main" id="{CDD1EA0A-27A3-4B0B-B468-E674C1D6D99A}"/>
+              </a:ext>
+            </a:extLst>
+          </p:cNvPr>
+          <p:cNvCxnSpPr>
+            <a:cxnSpLocks/>
+          </p:cNvCxnSpPr>
+          <p:nvPr/>
+        </p:nvCxnSpPr>
+        <p:spPr>
+          <a:xfrm>
+            <a:off x="6579554" y="5722410"/>
+            <a:ext cx="735646" cy="0"/>
+          </a:xfrm>
+          <a:prstGeom prst="straightConnector1">
+            <a:avLst/>
+          </a:prstGeom>
+          <a:ln w="19050">
+            <a:solidFill>
+              <a:srgbClr val="0070C0"/>
+            </a:solidFill>
+            <a:tailEnd type="arrow"/>
+          </a:ln>
+        </p:spPr>
+        <p:style>
+          <a:lnRef idx="1">
+            <a:schemeClr val="accent1"/>
+          </a:lnRef>
+          <a:fillRef idx="0">
+            <a:schemeClr val="accent1"/>
+          </a:fillRef>
+          <a:effectRef idx="0">
+            <a:schemeClr val="accent1"/>
+          </a:effectRef>
+          <a:fontRef idx="minor">
+            <a:schemeClr val="tx1"/>
+          </a:fontRef>
+        </p:style>
+      </p:cxnSp>
+      <p:sp>
+        <p:nvSpPr>
+          <p:cNvPr id="118" name="Rectangle 117">
+            <a:extLst>
+              <a:ext uri="{FF2B5EF4-FFF2-40B4-BE49-F238E27FC236}">
+                <a16:creationId xmlns:a16="http://schemas.microsoft.com/office/drawing/2014/main" id="{AF779FB7-9674-4CE8-96B9-DC34071BFF81}"/>
+              </a:ext>
+            </a:extLst>
+          </p:cNvPr>
+          <p:cNvSpPr/>
+          <p:nvPr/>
+        </p:nvSpPr>
+        <p:spPr>
+          <a:xfrm>
+            <a:off x="8034177" y="6111003"/>
+            <a:ext cx="119223" cy="123309"/>
+          </a:xfrm>
+          <a:prstGeom prst="rect">
+            <a:avLst/>
+          </a:prstGeom>
+          <a:solidFill>
+            <a:srgbClr val="0070C0"/>
+          </a:solidFill>
+          <a:ln>
+            <a:solidFill>
+              <a:srgbClr val="0070C0"/>
+            </a:solidFill>
+          </a:ln>
+          <a:effectLst/>
+        </p:spPr>
+        <p:style>
+          <a:lnRef idx="1">
+            <a:schemeClr val="accent3"/>
+          </a:lnRef>
+          <a:fillRef idx="2">
+            <a:schemeClr val="accent3"/>
+          </a:fillRef>
+          <a:effectRef idx="1">
+            <a:schemeClr val="accent3"/>
+          </a:effectRef>
+          <a:fontRef idx="minor">
+            <a:schemeClr val="dk1"/>
+          </a:fontRef>
+        </p:style>
+        <p:txBody>
+          <a:bodyPr rtlCol="0" anchor="ctr"/>
+          <a:lstStyle/>
+          <a:p>
+            <a:pPr algn="ctr"/>
+            <a:endParaRPr lang="en-SG" sz="1400"/>
+          </a:p>
+        </p:txBody>
+      </p:sp>
+      <p:cxnSp>
+        <p:nvCxnSpPr>
+          <p:cNvPr id="119" name="Straight Arrow Connector 118">
+            <a:extLst>
+              <a:ext uri="{FF2B5EF4-FFF2-40B4-BE49-F238E27FC236}">
+                <a16:creationId xmlns:a16="http://schemas.microsoft.com/office/drawing/2014/main" id="{63222A36-9F70-4403-B5AD-86840ED909BE}"/>
+              </a:ext>
+            </a:extLst>
+          </p:cNvPr>
+          <p:cNvCxnSpPr>
+            <a:cxnSpLocks/>
+          </p:cNvCxnSpPr>
+          <p:nvPr/>
+        </p:nvCxnSpPr>
+        <p:spPr>
+          <a:xfrm>
+            <a:off x="6602254" y="6234312"/>
+            <a:ext cx="1434694" cy="0"/>
+          </a:xfrm>
+          <a:prstGeom prst="straightConnector1">
+            <a:avLst/>
+          </a:prstGeom>
+          <a:ln w="19050">
+            <a:solidFill>
+              <a:srgbClr val="0070C0"/>
+            </a:solidFill>
+            <a:prstDash val="sysDash"/>
+            <a:headEnd type="arrow" w="med" len="med"/>
+            <a:tailEnd type="none" w="med" len="med"/>
+          </a:ln>
+        </p:spPr>
+        <p:style>
+          <a:lnRef idx="1">
+            <a:schemeClr val="accent1"/>
+          </a:lnRef>
+          <a:fillRef idx="0">
+            <a:schemeClr val="accent1"/>
+          </a:fillRef>
+          <a:effectRef idx="0">
+            <a:schemeClr val="accent1"/>
+          </a:effectRef>
+          <a:fontRef idx="minor">
+            <a:schemeClr val="tx1"/>
+          </a:fontRef>
+        </p:style>
+      </p:cxnSp>
     </p:spTree>
     <p:extLst>
       <p:ext uri="{BB962C8B-B14F-4D97-AF65-F5344CB8AC3E}">

</xml_diff>

<commit_message>
Developer Guide: Updated with new sequence diagram for Import
</commit_message>
<xml_diff>
--- a/docs/diagrams/ImportCommandSequenceDiagram.pptx
+++ b/docs/diagrams/ImportCommandSequenceDiagram.pptx
@@ -208,7 +208,7 @@
           <a:p>
             <a:fld id="{F5CC4B3F-88C1-4FFA-B1B6-F41C21DC6924}" type="datetimeFigureOut">
               <a:rPr lang="en-US" smtClean="0"/>
-              <a:t>10/19/2017</a:t>
+              <a:t>11/11/2017</a:t>
             </a:fld>
             <a:endParaRPr lang="en-US"/>
           </a:p>
@@ -654,7 +654,7 @@
           <a:p>
             <a:fld id="{78C97017-6FC3-485B-9764-EAC9E56C1D49}" type="datetimeFigureOut">
               <a:rPr lang="en-US" smtClean="0"/>
-              <a:t>10/19/2017</a:t>
+              <a:t>11/11/2017</a:t>
             </a:fld>
             <a:endParaRPr lang="en-US"/>
           </a:p>
@@ -822,7 +822,7 @@
           <a:p>
             <a:fld id="{78C97017-6FC3-485B-9764-EAC9E56C1D49}" type="datetimeFigureOut">
               <a:rPr lang="en-US" smtClean="0"/>
-              <a:t>10/19/2017</a:t>
+              <a:t>11/11/2017</a:t>
             </a:fld>
             <a:endParaRPr lang="en-US"/>
           </a:p>
@@ -1000,7 +1000,7 @@
           <a:p>
             <a:fld id="{78C97017-6FC3-485B-9764-EAC9E56C1D49}" type="datetimeFigureOut">
               <a:rPr lang="en-US" smtClean="0"/>
-              <a:t>10/19/2017</a:t>
+              <a:t>11/11/2017</a:t>
             </a:fld>
             <a:endParaRPr lang="en-US"/>
           </a:p>
@@ -1168,7 +1168,7 @@
           <a:p>
             <a:fld id="{78C97017-6FC3-485B-9764-EAC9E56C1D49}" type="datetimeFigureOut">
               <a:rPr lang="en-US" smtClean="0"/>
-              <a:t>10/19/2017</a:t>
+              <a:t>11/11/2017</a:t>
             </a:fld>
             <a:endParaRPr lang="en-US"/>
           </a:p>
@@ -1413,7 +1413,7 @@
           <a:p>
             <a:fld id="{78C97017-6FC3-485B-9764-EAC9E56C1D49}" type="datetimeFigureOut">
               <a:rPr lang="en-US" smtClean="0"/>
-              <a:t>10/19/2017</a:t>
+              <a:t>11/11/2017</a:t>
             </a:fld>
             <a:endParaRPr lang="en-US"/>
           </a:p>
@@ -1698,7 +1698,7 @@
           <a:p>
             <a:fld id="{78C97017-6FC3-485B-9764-EAC9E56C1D49}" type="datetimeFigureOut">
               <a:rPr lang="en-US" smtClean="0"/>
-              <a:t>10/19/2017</a:t>
+              <a:t>11/11/2017</a:t>
             </a:fld>
             <a:endParaRPr lang="en-US"/>
           </a:p>
@@ -2117,7 +2117,7 @@
           <a:p>
             <a:fld id="{78C97017-6FC3-485B-9764-EAC9E56C1D49}" type="datetimeFigureOut">
               <a:rPr lang="en-US" smtClean="0"/>
-              <a:t>10/19/2017</a:t>
+              <a:t>11/11/2017</a:t>
             </a:fld>
             <a:endParaRPr lang="en-US"/>
           </a:p>
@@ -2234,7 +2234,7 @@
           <a:p>
             <a:fld id="{78C97017-6FC3-485B-9764-EAC9E56C1D49}" type="datetimeFigureOut">
               <a:rPr lang="en-US" smtClean="0"/>
-              <a:t>10/19/2017</a:t>
+              <a:t>11/11/2017</a:t>
             </a:fld>
             <a:endParaRPr lang="en-US"/>
           </a:p>
@@ -2329,7 +2329,7 @@
           <a:p>
             <a:fld id="{78C97017-6FC3-485B-9764-EAC9E56C1D49}" type="datetimeFigureOut">
               <a:rPr lang="en-US" smtClean="0"/>
-              <a:t>10/19/2017</a:t>
+              <a:t>11/11/2017</a:t>
             </a:fld>
             <a:endParaRPr lang="en-US"/>
           </a:p>
@@ -2604,7 +2604,7 @@
           <a:p>
             <a:fld id="{78C97017-6FC3-485B-9764-EAC9E56C1D49}" type="datetimeFigureOut">
               <a:rPr lang="en-US" smtClean="0"/>
-              <a:t>10/19/2017</a:t>
+              <a:t>11/11/2017</a:t>
             </a:fld>
             <a:endParaRPr lang="en-US"/>
           </a:p>
@@ -2856,7 +2856,7 @@
           <a:p>
             <a:fld id="{78C97017-6FC3-485B-9764-EAC9E56C1D49}" type="datetimeFigureOut">
               <a:rPr lang="en-US" smtClean="0"/>
-              <a:t>10/19/2017</a:t>
+              <a:t>11/11/2017</a:t>
             </a:fld>
             <a:endParaRPr lang="en-US"/>
           </a:p>
@@ -3067,7 +3067,7 @@
           <a:p>
             <a:fld id="{78C97017-6FC3-485B-9764-EAC9E56C1D49}" type="datetimeFigureOut">
               <a:rPr lang="en-US" smtClean="0"/>
-              <a:t>10/19/2017</a:t>
+              <a:t>11/11/2017</a:t>
             </a:fld>
             <a:endParaRPr lang="en-US"/>
           </a:p>
@@ -3450,8 +3450,8 @@
         </p:nvSpPr>
         <p:spPr>
           <a:xfrm>
-            <a:off x="457200" y="2057400"/>
-            <a:ext cx="7252956" cy="4000286"/>
+            <a:off x="478508" y="2005231"/>
+            <a:ext cx="7589378" cy="4000286"/>
           </a:xfrm>
           <a:prstGeom prst="roundRect">
             <a:avLst>
@@ -5451,10 +5451,194 @@
       </p:sp>
       <p:sp>
         <p:nvSpPr>
-          <p:cNvPr id="66" name="Rectangle 65">
+          <p:cNvPr id="61" name="TextBox 60">
             <a:extLst>
               <a:ext uri="{FF2B5EF4-FFF2-40B4-BE49-F238E27FC236}">
-                <a16:creationId xmlns:a16="http://schemas.microsoft.com/office/drawing/2014/main" id="{D88256CE-5B32-4A03-9980-F7D860864CC5}"/>
+                <a16:creationId xmlns="" xmlns:a16="http://schemas.microsoft.com/office/drawing/2014/main" id="{17425778-2F89-45FF-8315-29D3A12DB3DB}"/>
+              </a:ext>
+            </a:extLst>
+          </p:cNvPr>
+          <p:cNvSpPr txBox="1"/>
+          <p:nvPr/>
+        </p:nvSpPr>
+        <p:spPr>
+          <a:xfrm>
+            <a:off x="6766819" y="4382427"/>
+            <a:ext cx="780714" cy="200055"/>
+          </a:xfrm>
+          <a:prstGeom prst="rect">
+            <a:avLst/>
+          </a:prstGeom>
+          <a:noFill/>
+        </p:spPr>
+        <p:txBody>
+          <a:bodyPr wrap="square" rtlCol="0">
+            <a:spAutoFit/>
+          </a:bodyPr>
+          <a:lstStyle/>
+          <a:p>
+            <a:r>
+              <a:rPr lang="en-US" sz="700" dirty="0">
+                <a:solidFill>
+                  <a:schemeClr val="tx2"/>
+                </a:solidFill>
+              </a:rPr>
+              <a:t>authorize()</a:t>
+            </a:r>
+            <a:endParaRPr lang="en-SG" sz="700" dirty="0">
+              <a:solidFill>
+                <a:schemeClr val="tx2"/>
+              </a:solidFill>
+            </a:endParaRPr>
+          </a:p>
+        </p:txBody>
+      </p:sp>
+      <p:sp>
+        <p:nvSpPr>
+          <p:cNvPr id="91" name="TextBox 90">
+            <a:extLst>
+              <a:ext uri="{FF2B5EF4-FFF2-40B4-BE49-F238E27FC236}">
+                <a16:creationId xmlns="" xmlns:a16="http://schemas.microsoft.com/office/drawing/2014/main" id="{AFF8E333-8B4C-47EB-A485-A9CCCD9238A9}"/>
+              </a:ext>
+            </a:extLst>
+          </p:cNvPr>
+          <p:cNvSpPr txBox="1"/>
+          <p:nvPr/>
+        </p:nvSpPr>
+        <p:spPr>
+          <a:xfrm>
+            <a:off x="6866829" y="4609558"/>
+            <a:ext cx="814224" cy="200055"/>
+          </a:xfrm>
+          <a:prstGeom prst="rect">
+            <a:avLst/>
+          </a:prstGeom>
+          <a:noFill/>
+        </p:spPr>
+        <p:txBody>
+          <a:bodyPr wrap="square" rtlCol="0">
+            <a:spAutoFit/>
+          </a:bodyPr>
+          <a:lstStyle/>
+          <a:p>
+            <a:r>
+              <a:rPr lang="en-US" sz="700" dirty="0">
+                <a:solidFill>
+                  <a:schemeClr val="tx2"/>
+                </a:solidFill>
+              </a:rPr>
+              <a:t>credential</a:t>
+            </a:r>
+            <a:endParaRPr lang="en-SG" sz="1000" dirty="0">
+              <a:solidFill>
+                <a:schemeClr val="tx2"/>
+              </a:solidFill>
+            </a:endParaRPr>
+          </a:p>
+        </p:txBody>
+      </p:sp>
+      <p:sp>
+        <p:nvSpPr>
+          <p:cNvPr id="96" name="TextBox 95">
+            <a:extLst>
+              <a:ext uri="{FF2B5EF4-FFF2-40B4-BE49-F238E27FC236}">
+                <a16:creationId xmlns="" xmlns:a16="http://schemas.microsoft.com/office/drawing/2014/main" id="{1D582DEE-01C2-41C1-8C3A-E2FFF79B3139}"/>
+              </a:ext>
+            </a:extLst>
+          </p:cNvPr>
+          <p:cNvSpPr txBox="1"/>
+          <p:nvPr/>
+        </p:nvSpPr>
+        <p:spPr>
+          <a:xfrm>
+            <a:off x="6565775" y="4791774"/>
+            <a:ext cx="1654557" cy="200055"/>
+          </a:xfrm>
+          <a:prstGeom prst="rect">
+            <a:avLst/>
+          </a:prstGeom>
+          <a:noFill/>
+        </p:spPr>
+        <p:txBody>
+          <a:bodyPr wrap="square" rtlCol="0">
+            <a:spAutoFit/>
+          </a:bodyPr>
+          <a:lstStyle/>
+          <a:p>
+            <a:r>
+              <a:rPr lang="en-US" sz="700" dirty="0" err="1">
+                <a:solidFill>
+                  <a:schemeClr val="tx2"/>
+                </a:solidFill>
+              </a:rPr>
+              <a:t>retrieveContacts</a:t>
+            </a:r>
+            <a:r>
+              <a:rPr lang="en-US" sz="700" dirty="0">
+                <a:solidFill>
+                  <a:schemeClr val="tx2"/>
+                </a:solidFill>
+              </a:rPr>
+              <a:t>(credential)</a:t>
+            </a:r>
+            <a:endParaRPr lang="en-SG" sz="700" dirty="0">
+              <a:solidFill>
+                <a:schemeClr val="tx2"/>
+              </a:solidFill>
+            </a:endParaRPr>
+          </a:p>
+        </p:txBody>
+      </p:sp>
+      <p:sp>
+        <p:nvSpPr>
+          <p:cNvPr id="98" name="TextBox 97">
+            <a:extLst>
+              <a:ext uri="{FF2B5EF4-FFF2-40B4-BE49-F238E27FC236}">
+                <a16:creationId xmlns="" xmlns:a16="http://schemas.microsoft.com/office/drawing/2014/main" id="{79A9DABD-F3D7-4752-98EB-4E663F0C3018}"/>
+              </a:ext>
+            </a:extLst>
+          </p:cNvPr>
+          <p:cNvSpPr txBox="1"/>
+          <p:nvPr/>
+        </p:nvSpPr>
+        <p:spPr>
+          <a:xfrm>
+            <a:off x="6851677" y="4959143"/>
+            <a:ext cx="814224" cy="200055"/>
+          </a:xfrm>
+          <a:prstGeom prst="rect">
+            <a:avLst/>
+          </a:prstGeom>
+          <a:noFill/>
+        </p:spPr>
+        <p:txBody>
+          <a:bodyPr wrap="square" rtlCol="0">
+            <a:spAutoFit/>
+          </a:bodyPr>
+          <a:lstStyle/>
+          <a:p>
+            <a:r>
+              <a:rPr lang="en-US" sz="700" dirty="0">
+                <a:solidFill>
+                  <a:schemeClr val="tx2"/>
+                </a:solidFill>
+              </a:rPr>
+              <a:t>connections</a:t>
+            </a:r>
+            <a:endParaRPr lang="en-SG" sz="1000" dirty="0">
+              <a:solidFill>
+                <a:schemeClr val="tx2"/>
+              </a:solidFill>
+            </a:endParaRPr>
+          </a:p>
+        </p:txBody>
+      </p:sp>
+      <p:sp>
+        <p:nvSpPr>
+          <p:cNvPr id="99" name="Rectangle 65">
+            <a:extLst>
+              <a:ext uri="{FF2B5EF4-FFF2-40B4-BE49-F238E27FC236}">
+                <a16:creationId xmlns="" xmlns:a16="http://schemas.microsoft.com/office/drawing/2014/main" id="{96F27D04-F2B1-40A5-81FC-C2FD6B25DC31}"/>
               </a:ext>
             </a:extLst>
           </p:cNvPr>
@@ -5463,7 +5647,7 @@
         </p:nvSpPr>
         <p:spPr>
           <a:xfrm>
-            <a:off x="6539513" y="4600575"/>
+            <a:off x="6536945" y="5341741"/>
             <a:ext cx="152400" cy="200025"/>
           </a:xfrm>
           <a:custGeom>
@@ -5577,28 +5761,24 @@
       </p:sp>
       <p:cxnSp>
         <p:nvCxnSpPr>
-          <p:cNvPr id="59" name="Connector: Curved 58">
+          <p:cNvPr id="100" name="Connector: Curved 99">
             <a:extLst>
               <a:ext uri="{FF2B5EF4-FFF2-40B4-BE49-F238E27FC236}">
-                <a16:creationId xmlns:a16="http://schemas.microsoft.com/office/drawing/2014/main" id="{1D298A7C-1787-4C77-BCC0-1A981B87D50B}"/>
+                <a16:creationId xmlns="" xmlns:a16="http://schemas.microsoft.com/office/drawing/2014/main" id="{7EA7DCBE-70BE-4ECF-B1E2-1017A1C450F4}"/>
               </a:ext>
             </a:extLst>
           </p:cNvPr>
-          <p:cNvCxnSpPr>
-            <a:cxnSpLocks/>
-            <a:stCxn id="65" idx="1"/>
-            <a:endCxn id="66" idx="2"/>
-          </p:cNvCxnSpPr>
+          <p:cNvCxnSpPr/>
           <p:nvPr/>
         </p:nvCxnSpPr>
         <p:spPr>
           <a:xfrm>
-            <a:off x="6602254" y="4543199"/>
-            <a:ext cx="89059" cy="57376"/>
+            <a:off x="6613993" y="5281546"/>
+            <a:ext cx="71140" cy="57375"/>
           </a:xfrm>
           <a:prstGeom prst="curvedConnector3">
             <a:avLst>
-              <a:gd name="adj1" fmla="val 357357"/>
+              <a:gd name="adj1" fmla="val 422182"/>
             </a:avLst>
           </a:prstGeom>
           <a:ln>
@@ -5622,10 +5802,10 @@
       </p:cxnSp>
       <p:sp>
         <p:nvSpPr>
-          <p:cNvPr id="61" name="TextBox 60">
+          <p:cNvPr id="102" name="TextBox 101">
             <a:extLst>
               <a:ext uri="{FF2B5EF4-FFF2-40B4-BE49-F238E27FC236}">
-                <a16:creationId xmlns:a16="http://schemas.microsoft.com/office/drawing/2014/main" id="{17425778-2F89-45FF-8315-29D3A12DB3DB}"/>
+                <a16:creationId xmlns="" xmlns:a16="http://schemas.microsoft.com/office/drawing/2014/main" id="{D6B5A2F6-B89E-4AE4-8E72-7214971C7FC1}"/>
               </a:ext>
             </a:extLst>
           </p:cNvPr>
@@ -5634,8 +5814,8 @@
         </p:nvSpPr>
         <p:spPr>
           <a:xfrm>
-            <a:off x="6846038" y="4432483"/>
-            <a:ext cx="780714" cy="200055"/>
+            <a:off x="6672562" y="5128765"/>
+            <a:ext cx="1694132" cy="200055"/>
           </a:xfrm>
           <a:prstGeom prst="rect">
             <a:avLst/>
@@ -5648,13 +5828,21 @@
           </a:bodyPr>
           <a:lstStyle/>
           <a:p>
+            <a:r>
+              <a:rPr lang="en-US" sz="700" dirty="0" err="1">
+                <a:solidFill>
+                  <a:schemeClr val="tx2"/>
+                </a:solidFill>
+              </a:rPr>
+              <a:t>importContacts</a:t>
+            </a:r>
             <a:r>
               <a:rPr lang="en-US" sz="700" dirty="0">
                 <a:solidFill>
                   <a:schemeClr val="tx2"/>
                 </a:solidFill>
               </a:rPr>
-              <a:t>authorize()</a:t>
+              <a:t>(connections)</a:t>
             </a:r>
             <a:endParaRPr lang="en-SG" sz="700" dirty="0">
               <a:solidFill>
@@ -5664,12 +5852,64 @@
           </a:p>
         </p:txBody>
       </p:sp>
+      <p:sp>
+        <p:nvSpPr>
+          <p:cNvPr id="113" name="TextBox 112">
+            <a:extLst>
+              <a:ext uri="{FF2B5EF4-FFF2-40B4-BE49-F238E27FC236}">
+                <a16:creationId xmlns="" xmlns:a16="http://schemas.microsoft.com/office/drawing/2014/main" id="{79C82149-9DE4-46AD-B1D0-0AE1A9F5659D}"/>
+              </a:ext>
+            </a:extLst>
+          </p:cNvPr>
+          <p:cNvSpPr txBox="1"/>
+          <p:nvPr/>
+        </p:nvSpPr>
+        <p:spPr>
+          <a:xfrm>
+            <a:off x="7796376" y="5253795"/>
+            <a:ext cx="814224" cy="200055"/>
+          </a:xfrm>
+          <a:prstGeom prst="rect">
+            <a:avLst/>
+          </a:prstGeom>
+          <a:noFill/>
+        </p:spPr>
+        <p:txBody>
+          <a:bodyPr wrap="square" rtlCol="0">
+            <a:spAutoFit/>
+          </a:bodyPr>
+          <a:lstStyle/>
+          <a:p>
+            <a:r>
+              <a:rPr lang="en-US" sz="700" dirty="0" err="1">
+                <a:solidFill>
+                  <a:schemeClr val="tx2"/>
+                </a:solidFill>
+              </a:rPr>
+              <a:t>addPerson</a:t>
+            </a:r>
+            <a:r>
+              <a:rPr lang="en-US" sz="700" dirty="0">
+                <a:solidFill>
+                  <a:schemeClr val="tx2"/>
+                </a:solidFill>
+              </a:rPr>
+              <a:t>(p)</a:t>
+            </a:r>
+            <a:endParaRPr lang="en-SG" sz="1000" dirty="0">
+              <a:solidFill>
+                <a:schemeClr val="tx2"/>
+              </a:solidFill>
+            </a:endParaRPr>
+          </a:p>
+        </p:txBody>
+      </p:sp>
       <p:cxnSp>
         <p:nvCxnSpPr>
-          <p:cNvPr id="70" name="Connector: Curved 69">
+          <p:cNvPr id="114" name="Straight Arrow Connector 113">
             <a:extLst>
               <a:ext uri="{FF2B5EF4-FFF2-40B4-BE49-F238E27FC236}">
-                <a16:creationId xmlns:a16="http://schemas.microsoft.com/office/drawing/2014/main" id="{06228542-8986-4341-B3ED-317676D63F71}"/>
+                <a16:creationId xmlns="" xmlns:a16="http://schemas.microsoft.com/office/drawing/2014/main" id="{CDD1EA0A-27A3-4B0B-B468-E674C1D6D99A}"/>
               </a:ext>
             </a:extLst>
           </p:cNvPr>
@@ -5679,17 +5919,18 @@
           <p:nvPr/>
         </p:nvCxnSpPr>
         <p:spPr>
-          <a:xfrm flipH="1">
-            <a:off x="6617945" y="4798504"/>
-            <a:ext cx="68070" cy="53206"/>
-          </a:xfrm>
-          <a:prstGeom prst="curvedConnector3">
-            <a:avLst>
-              <a:gd name="adj1" fmla="val -335831"/>
-            </a:avLst>
+          <a:xfrm>
+            <a:off x="6579554" y="5722410"/>
+            <a:ext cx="735646" cy="0"/>
+          </a:xfrm>
+          <a:prstGeom prst="straightConnector1">
+            <a:avLst/>
           </a:prstGeom>
-          <a:ln>
-            <a:tailEnd type="triangle" w="sm" len="sm"/>
+          <a:ln w="19050">
+            <a:solidFill>
+              <a:srgbClr val="0070C0"/>
+            </a:solidFill>
+            <a:tailEnd type="arrow"/>
           </a:ln>
         </p:spPr>
         <p:style>
@@ -5709,54 +5950,10 @@
       </p:cxnSp>
       <p:sp>
         <p:nvSpPr>
-          <p:cNvPr id="91" name="TextBox 90">
+          <p:cNvPr id="118" name="Rectangle 117">
             <a:extLst>
               <a:ext uri="{FF2B5EF4-FFF2-40B4-BE49-F238E27FC236}">
-                <a16:creationId xmlns:a16="http://schemas.microsoft.com/office/drawing/2014/main" id="{AFF8E333-8B4C-47EB-A485-A9CCCD9238A9}"/>
-              </a:ext>
-            </a:extLst>
-          </p:cNvPr>
-          <p:cNvSpPr txBox="1"/>
-          <p:nvPr/>
-        </p:nvSpPr>
-        <p:spPr>
-          <a:xfrm>
-            <a:off x="6845514" y="4707671"/>
-            <a:ext cx="814224" cy="200055"/>
-          </a:xfrm>
-          <a:prstGeom prst="rect">
-            <a:avLst/>
-          </a:prstGeom>
-          <a:noFill/>
-        </p:spPr>
-        <p:txBody>
-          <a:bodyPr wrap="square" rtlCol="0">
-            <a:spAutoFit/>
-          </a:bodyPr>
-          <a:lstStyle/>
-          <a:p>
-            <a:r>
-              <a:rPr lang="en-US" sz="700" dirty="0">
-                <a:solidFill>
-                  <a:schemeClr val="tx2"/>
-                </a:solidFill>
-              </a:rPr>
-              <a:t>credential</a:t>
-            </a:r>
-            <a:endParaRPr lang="en-SG" sz="1000" dirty="0">
-              <a:solidFill>
-                <a:schemeClr val="tx2"/>
-              </a:solidFill>
-            </a:endParaRPr>
-          </a:p>
-        </p:txBody>
-      </p:sp>
-      <p:sp>
-        <p:nvSpPr>
-          <p:cNvPr id="92" name="Rectangle 65">
-            <a:extLst>
-              <a:ext uri="{FF2B5EF4-FFF2-40B4-BE49-F238E27FC236}">
-                <a16:creationId xmlns:a16="http://schemas.microsoft.com/office/drawing/2014/main" id="{CD566D73-E849-47C0-810B-A87AF708153F}"/>
+                <a16:creationId xmlns="" xmlns:a16="http://schemas.microsoft.com/office/drawing/2014/main" id="{AF779FB7-9674-4CE8-96B9-DC34071BFF81}"/>
               </a:ext>
             </a:extLst>
           </p:cNvPr>
@@ -5765,87 +5962,18 @@
         </p:nvSpPr>
         <p:spPr>
           <a:xfrm>
-            <a:off x="6538998" y="4974159"/>
-            <a:ext cx="152400" cy="200025"/>
-          </a:xfrm>
-          <a:custGeom>
+            <a:off x="8034177" y="6111003"/>
+            <a:ext cx="119223" cy="123309"/>
+          </a:xfrm>
+          <a:prstGeom prst="rect">
             <a:avLst/>
-            <a:gdLst>
-              <a:gd name="connsiteX0" fmla="*/ 0 w 152400"/>
-              <a:gd name="connsiteY0" fmla="*/ 0 h 199803"/>
-              <a:gd name="connsiteX1" fmla="*/ 152400 w 152400"/>
-              <a:gd name="connsiteY1" fmla="*/ 0 h 199803"/>
-              <a:gd name="connsiteX2" fmla="*/ 152400 w 152400"/>
-              <a:gd name="connsiteY2" fmla="*/ 199803 h 199803"/>
-              <a:gd name="connsiteX3" fmla="*/ 0 w 152400"/>
-              <a:gd name="connsiteY3" fmla="*/ 199803 h 199803"/>
-              <a:gd name="connsiteX4" fmla="*/ 0 w 152400"/>
-              <a:gd name="connsiteY4" fmla="*/ 0 h 199803"/>
-              <a:gd name="connsiteX0" fmla="*/ 0 w 152400"/>
-              <a:gd name="connsiteY0" fmla="*/ 222 h 200025"/>
-              <a:gd name="connsiteX1" fmla="*/ 152400 w 152400"/>
-              <a:gd name="connsiteY1" fmla="*/ 222 h 200025"/>
-              <a:gd name="connsiteX2" fmla="*/ 151800 w 152400"/>
-              <a:gd name="connsiteY2" fmla="*/ 0 h 200025"/>
-              <a:gd name="connsiteX3" fmla="*/ 152400 w 152400"/>
-              <a:gd name="connsiteY3" fmla="*/ 200025 h 200025"/>
-              <a:gd name="connsiteX4" fmla="*/ 0 w 152400"/>
-              <a:gd name="connsiteY4" fmla="*/ 200025 h 200025"/>
-              <a:gd name="connsiteX5" fmla="*/ 0 w 152400"/>
-              <a:gd name="connsiteY5" fmla="*/ 222 h 200025"/>
-            </a:gdLst>
-            <a:ahLst/>
-            <a:cxnLst>
-              <a:cxn ang="0">
-                <a:pos x="connsiteX0" y="connsiteY0"/>
-              </a:cxn>
-              <a:cxn ang="0">
-                <a:pos x="connsiteX1" y="connsiteY1"/>
-              </a:cxn>
-              <a:cxn ang="0">
-                <a:pos x="connsiteX2" y="connsiteY2"/>
-              </a:cxn>
-              <a:cxn ang="0">
-                <a:pos x="connsiteX3" y="connsiteY3"/>
-              </a:cxn>
-              <a:cxn ang="0">
-                <a:pos x="connsiteX4" y="connsiteY4"/>
-              </a:cxn>
-              <a:cxn ang="0">
-                <a:pos x="connsiteX5" y="connsiteY5"/>
-              </a:cxn>
-            </a:cxnLst>
-            <a:rect l="l" t="t" r="r" b="b"/>
-            <a:pathLst>
-              <a:path w="152400" h="200025">
-                <a:moveTo>
-                  <a:pt x="0" y="222"/>
-                </a:moveTo>
-                <a:lnTo>
-                  <a:pt x="152400" y="222"/>
-                </a:lnTo>
-                <a:lnTo>
-                  <a:pt x="151800" y="0"/>
-                </a:lnTo>
-                <a:lnTo>
-                  <a:pt x="152400" y="200025"/>
-                </a:lnTo>
-                <a:lnTo>
-                  <a:pt x="0" y="200025"/>
-                </a:lnTo>
-                <a:lnTo>
-                  <a:pt x="0" y="222"/>
-                </a:lnTo>
-                <a:close/>
-              </a:path>
-            </a:pathLst>
-          </a:custGeom>
+          </a:prstGeom>
           <a:solidFill>
-            <a:schemeClr val="bg1"/>
+            <a:srgbClr val="0070C0"/>
           </a:solidFill>
           <a:ln>
             <a:solidFill>
-              <a:schemeClr val="accent1"/>
+              <a:srgbClr val="0070C0"/>
             </a:solidFill>
           </a:ln>
           <a:effectLst/>
@@ -5869,61 +5997,16 @@
           <a:lstStyle/>
           <a:p>
             <a:pPr algn="ctr"/>
-            <a:endParaRPr lang="en-SG" sz="1400">
-              <a:solidFill>
-                <a:schemeClr val="dk1"/>
-              </a:solidFill>
-            </a:endParaRPr>
+            <a:endParaRPr lang="en-SG" sz="1400"/>
           </a:p>
         </p:txBody>
       </p:sp>
       <p:cxnSp>
         <p:nvCxnSpPr>
-          <p:cNvPr id="94" name="Connector: Curved 93">
+          <p:cNvPr id="119" name="Straight Arrow Connector 118">
             <a:extLst>
               <a:ext uri="{FF2B5EF4-FFF2-40B4-BE49-F238E27FC236}">
-                <a16:creationId xmlns:a16="http://schemas.microsoft.com/office/drawing/2014/main" id="{1D7D4175-E588-4501-8194-901612FFCCFB}"/>
-              </a:ext>
-            </a:extLst>
-          </p:cNvPr>
-          <p:cNvCxnSpPr/>
-          <p:nvPr/>
-        </p:nvCxnSpPr>
-        <p:spPr>
-          <a:xfrm>
-            <a:off x="6615198" y="4920953"/>
-            <a:ext cx="71140" cy="57375"/>
-          </a:xfrm>
-          <a:prstGeom prst="curvedConnector3">
-            <a:avLst>
-              <a:gd name="adj1" fmla="val 422182"/>
-            </a:avLst>
-          </a:prstGeom>
-          <a:ln>
-            <a:tailEnd type="triangle" w="sm" len="sm"/>
-          </a:ln>
-        </p:spPr>
-        <p:style>
-          <a:lnRef idx="1">
-            <a:schemeClr val="accent1"/>
-          </a:lnRef>
-          <a:fillRef idx="0">
-            <a:schemeClr val="accent1"/>
-          </a:fillRef>
-          <a:effectRef idx="0">
-            <a:schemeClr val="accent1"/>
-          </a:effectRef>
-          <a:fontRef idx="minor">
-            <a:schemeClr val="tx1"/>
-          </a:fontRef>
-        </p:style>
-      </p:cxnSp>
-      <p:cxnSp>
-        <p:nvCxnSpPr>
-          <p:cNvPr id="95" name="Connector: Curved 94">
-            <a:extLst>
-              <a:ext uri="{FF2B5EF4-FFF2-40B4-BE49-F238E27FC236}">
-                <a16:creationId xmlns:a16="http://schemas.microsoft.com/office/drawing/2014/main" id="{4C75C18C-1FF2-4EA4-AAC8-365AB8604356}"/>
+                <a16:creationId xmlns="" xmlns:a16="http://schemas.microsoft.com/office/drawing/2014/main" id="{63222A36-9F70-4403-B5AD-86840ED909BE}"/>
               </a:ext>
             </a:extLst>
           </p:cNvPr>
@@ -5933,17 +6016,20 @@
           <p:nvPr/>
         </p:nvCxnSpPr>
         <p:spPr>
-          <a:xfrm flipH="1">
-            <a:off x="6622130" y="5172665"/>
-            <a:ext cx="68070" cy="53206"/>
-          </a:xfrm>
-          <a:prstGeom prst="curvedConnector3">
-            <a:avLst>
-              <a:gd name="adj1" fmla="val -335831"/>
-            </a:avLst>
+          <a:xfrm>
+            <a:off x="6602254" y="6234312"/>
+            <a:ext cx="1434694" cy="0"/>
+          </a:xfrm>
+          <a:prstGeom prst="straightConnector1">
+            <a:avLst/>
           </a:prstGeom>
-          <a:ln>
-            <a:tailEnd type="triangle" w="sm" len="sm"/>
+          <a:ln w="19050">
+            <a:solidFill>
+              <a:srgbClr val="0070C0"/>
+            </a:solidFill>
+            <a:prstDash val="sysDash"/>
+            <a:headEnd type="arrow" w="med" len="med"/>
+            <a:tailEnd type="none" w="med" len="med"/>
           </a:ln>
         </p:spPr>
         <p:style>
@@ -5963,195 +6049,128 @@
       </p:cxnSp>
       <p:sp>
         <p:nvSpPr>
-          <p:cNvPr id="96" name="TextBox 95">
-            <a:extLst>
-              <a:ext uri="{FF2B5EF4-FFF2-40B4-BE49-F238E27FC236}">
-                <a16:creationId xmlns:a16="http://schemas.microsoft.com/office/drawing/2014/main" id="{1D582DEE-01C2-41C1-8C3A-E2FFF79B3139}"/>
-              </a:ext>
-            </a:extLst>
-          </p:cNvPr>
-          <p:cNvSpPr txBox="1"/>
+          <p:cNvPr id="60" name="Rectangle 62"/>
+          <p:cNvSpPr/>
           <p:nvPr/>
         </p:nvSpPr>
         <p:spPr>
           <a:xfrm>
-            <a:off x="6839939" y="4820839"/>
-            <a:ext cx="1654557" cy="200055"/>
+            <a:off x="7312480" y="3866576"/>
+            <a:ext cx="1133543" cy="461538"/>
           </a:xfrm>
           <a:prstGeom prst="rect">
             <a:avLst/>
           </a:prstGeom>
-          <a:noFill/>
-        </p:spPr>
-        <p:txBody>
-          <a:bodyPr wrap="square" rtlCol="0">
-            <a:spAutoFit/>
-          </a:bodyPr>
-          <a:lstStyle/>
-          <a:p>
-            <a:r>
-              <a:rPr lang="en-US" sz="700" dirty="0" err="1">
+          <a:solidFill>
+            <a:srgbClr val="0070C0"/>
+          </a:solidFill>
+          <a:ln w="19050">
+            <a:solidFill>
+              <a:srgbClr val="0070C0"/>
+            </a:solidFill>
+          </a:ln>
+          <a:effectLst/>
+        </p:spPr>
+        <p:style>
+          <a:lnRef idx="1">
+            <a:schemeClr val="accent2"/>
+          </a:lnRef>
+          <a:fillRef idx="2">
+            <a:schemeClr val="accent2"/>
+          </a:fillRef>
+          <a:effectRef idx="1">
+            <a:schemeClr val="accent2"/>
+          </a:effectRef>
+          <a:fontRef idx="minor">
+            <a:schemeClr val="dk1"/>
+          </a:fontRef>
+        </p:style>
+        <p:txBody>
+          <a:bodyPr rtlCol="0" anchor="ctr"/>
+          <a:lstStyle/>
+          <a:p>
+            <a:pPr algn="ctr"/>
+            <a:r>
+              <a:rPr lang="en-US" sz="1600" dirty="0" smtClean="0">
                 <a:solidFill>
-                  <a:schemeClr val="tx2"/>
+                  <a:schemeClr val="bg1"/>
                 </a:solidFill>
               </a:rPr>
-              <a:t>retrieveContacts</a:t>
-            </a:r>
-            <a:r>
-              <a:rPr lang="en-US" sz="700" dirty="0">
+              <a:t>:</a:t>
+            </a:r>
+            <a:r>
+              <a:rPr lang="en-US" sz="1600" dirty="0" err="1" smtClean="0">
                 <a:solidFill>
-                  <a:schemeClr val="tx2"/>
+                  <a:schemeClr val="bg1"/>
                 </a:solidFill>
               </a:rPr>
-              <a:t>(credential)</a:t>
-            </a:r>
-            <a:endParaRPr lang="en-SG" sz="700" dirty="0">
+              <a:t>GoogleUtil</a:t>
+            </a:r>
+            <a:endParaRPr lang="en-SG" sz="1600" dirty="0">
               <a:solidFill>
-                <a:schemeClr val="tx2"/>
+                <a:schemeClr val="bg1"/>
               </a:solidFill>
             </a:endParaRPr>
           </a:p>
         </p:txBody>
       </p:sp>
-      <p:sp>
-        <p:nvSpPr>
-          <p:cNvPr id="98" name="TextBox 97">
-            <a:extLst>
-              <a:ext uri="{FF2B5EF4-FFF2-40B4-BE49-F238E27FC236}">
-                <a16:creationId xmlns:a16="http://schemas.microsoft.com/office/drawing/2014/main" id="{79A9DABD-F3D7-4752-98EB-4E663F0C3018}"/>
-              </a:ext>
-            </a:extLst>
-          </p:cNvPr>
-          <p:cNvSpPr txBox="1"/>
+      <p:cxnSp>
+        <p:nvCxnSpPr>
+          <p:cNvPr id="62" name="Straight Connector 61"/>
+          <p:cNvCxnSpPr/>
           <p:nvPr/>
-        </p:nvSpPr>
-        <p:spPr>
-          <a:xfrm>
-            <a:off x="6632485" y="5007421"/>
-            <a:ext cx="814224" cy="200055"/>
+        </p:nvCxnSpPr>
+        <p:spPr>
+          <a:xfrm>
+            <a:off x="7873275" y="4319431"/>
+            <a:ext cx="0" cy="990600"/>
+          </a:xfrm>
+          <a:prstGeom prst="line">
+            <a:avLst/>
+          </a:prstGeom>
+          <a:ln w="19050">
+            <a:solidFill>
+              <a:srgbClr val="0070C0"/>
+            </a:solidFill>
+            <a:prstDash val="sysDash"/>
+          </a:ln>
+          <a:effectLst/>
+        </p:spPr>
+        <p:style>
+          <a:lnRef idx="1">
+            <a:schemeClr val="accent1"/>
+          </a:lnRef>
+          <a:fillRef idx="2">
+            <a:schemeClr val="accent1"/>
+          </a:fillRef>
+          <a:effectRef idx="1">
+            <a:schemeClr val="accent1"/>
+          </a:effectRef>
+          <a:fontRef idx="minor">
+            <a:schemeClr val="dk1"/>
+          </a:fontRef>
+        </p:style>
+      </p:cxnSp>
+      <p:sp>
+        <p:nvSpPr>
+          <p:cNvPr id="67" name="Rectangle 66"/>
+          <p:cNvSpPr/>
+          <p:nvPr/>
+        </p:nvSpPr>
+        <p:spPr>
+          <a:xfrm>
+            <a:off x="7799425" y="4581375"/>
+            <a:ext cx="174929" cy="194980"/>
           </a:xfrm>
           <a:prstGeom prst="rect">
             <a:avLst/>
           </a:prstGeom>
-          <a:noFill/>
-        </p:spPr>
-        <p:txBody>
-          <a:bodyPr wrap="square" rtlCol="0">
-            <a:spAutoFit/>
-          </a:bodyPr>
-          <a:lstStyle/>
-          <a:p>
-            <a:r>
-              <a:rPr lang="en-US" sz="700" dirty="0">
-                <a:solidFill>
-                  <a:schemeClr val="tx2"/>
-                </a:solidFill>
-              </a:rPr>
-              <a:t>connections</a:t>
-            </a:r>
-            <a:endParaRPr lang="en-SG" sz="1000" dirty="0">
-              <a:solidFill>
-                <a:schemeClr val="tx2"/>
-              </a:solidFill>
-            </a:endParaRPr>
-          </a:p>
-        </p:txBody>
-      </p:sp>
-      <p:sp>
-        <p:nvSpPr>
-          <p:cNvPr id="99" name="Rectangle 65">
-            <a:extLst>
-              <a:ext uri="{FF2B5EF4-FFF2-40B4-BE49-F238E27FC236}">
-                <a16:creationId xmlns:a16="http://schemas.microsoft.com/office/drawing/2014/main" id="{96F27D04-F2B1-40A5-81FC-C2FD6B25DC31}"/>
-              </a:ext>
-            </a:extLst>
-          </p:cNvPr>
-          <p:cNvSpPr/>
-          <p:nvPr/>
-        </p:nvSpPr>
-        <p:spPr>
-          <a:xfrm>
-            <a:off x="6536945" y="5341741"/>
-            <a:ext cx="152400" cy="200025"/>
-          </a:xfrm>
-          <a:custGeom>
-            <a:avLst/>
-            <a:gdLst>
-              <a:gd name="connsiteX0" fmla="*/ 0 w 152400"/>
-              <a:gd name="connsiteY0" fmla="*/ 0 h 199803"/>
-              <a:gd name="connsiteX1" fmla="*/ 152400 w 152400"/>
-              <a:gd name="connsiteY1" fmla="*/ 0 h 199803"/>
-              <a:gd name="connsiteX2" fmla="*/ 152400 w 152400"/>
-              <a:gd name="connsiteY2" fmla="*/ 199803 h 199803"/>
-              <a:gd name="connsiteX3" fmla="*/ 0 w 152400"/>
-              <a:gd name="connsiteY3" fmla="*/ 199803 h 199803"/>
-              <a:gd name="connsiteX4" fmla="*/ 0 w 152400"/>
-              <a:gd name="connsiteY4" fmla="*/ 0 h 199803"/>
-              <a:gd name="connsiteX0" fmla="*/ 0 w 152400"/>
-              <a:gd name="connsiteY0" fmla="*/ 222 h 200025"/>
-              <a:gd name="connsiteX1" fmla="*/ 152400 w 152400"/>
-              <a:gd name="connsiteY1" fmla="*/ 222 h 200025"/>
-              <a:gd name="connsiteX2" fmla="*/ 151800 w 152400"/>
-              <a:gd name="connsiteY2" fmla="*/ 0 h 200025"/>
-              <a:gd name="connsiteX3" fmla="*/ 152400 w 152400"/>
-              <a:gd name="connsiteY3" fmla="*/ 200025 h 200025"/>
-              <a:gd name="connsiteX4" fmla="*/ 0 w 152400"/>
-              <a:gd name="connsiteY4" fmla="*/ 200025 h 200025"/>
-              <a:gd name="connsiteX5" fmla="*/ 0 w 152400"/>
-              <a:gd name="connsiteY5" fmla="*/ 222 h 200025"/>
-            </a:gdLst>
-            <a:ahLst/>
-            <a:cxnLst>
-              <a:cxn ang="0">
-                <a:pos x="connsiteX0" y="connsiteY0"/>
-              </a:cxn>
-              <a:cxn ang="0">
-                <a:pos x="connsiteX1" y="connsiteY1"/>
-              </a:cxn>
-              <a:cxn ang="0">
-                <a:pos x="connsiteX2" y="connsiteY2"/>
-              </a:cxn>
-              <a:cxn ang="0">
-                <a:pos x="connsiteX3" y="connsiteY3"/>
-              </a:cxn>
-              <a:cxn ang="0">
-                <a:pos x="connsiteX4" y="connsiteY4"/>
-              </a:cxn>
-              <a:cxn ang="0">
-                <a:pos x="connsiteX5" y="connsiteY5"/>
-              </a:cxn>
-            </a:cxnLst>
-            <a:rect l="l" t="t" r="r" b="b"/>
-            <a:pathLst>
-              <a:path w="152400" h="200025">
-                <a:moveTo>
-                  <a:pt x="0" y="222"/>
-                </a:moveTo>
-                <a:lnTo>
-                  <a:pt x="152400" y="222"/>
-                </a:lnTo>
-                <a:lnTo>
-                  <a:pt x="151800" y="0"/>
-                </a:lnTo>
-                <a:lnTo>
-                  <a:pt x="152400" y="200025"/>
-                </a:lnTo>
-                <a:lnTo>
-                  <a:pt x="0" y="200025"/>
-                </a:lnTo>
-                <a:lnTo>
-                  <a:pt x="0" y="222"/>
-                </a:lnTo>
-                <a:close/>
-              </a:path>
-            </a:pathLst>
-          </a:custGeom>
           <a:solidFill>
-            <a:schemeClr val="bg1"/>
+            <a:srgbClr val="0070C0"/>
           </a:solidFill>
           <a:ln>
             <a:solidFill>
-              <a:schemeClr val="accent1"/>
+              <a:srgbClr val="0070C0"/>
             </a:solidFill>
           </a:ln>
           <a:effectLst/>
@@ -6185,167 +6204,14 @@
       </p:sp>
       <p:cxnSp>
         <p:nvCxnSpPr>
-          <p:cNvPr id="100" name="Connector: Curved 99">
-            <a:extLst>
-              <a:ext uri="{FF2B5EF4-FFF2-40B4-BE49-F238E27FC236}">
-                <a16:creationId xmlns:a16="http://schemas.microsoft.com/office/drawing/2014/main" id="{7EA7DCBE-70BE-4ECF-B1E2-1017A1C450F4}"/>
-              </a:ext>
-            </a:extLst>
-          </p:cNvPr>
+          <p:cNvPr id="63" name="Straight Arrow Connector 62"/>
           <p:cNvCxnSpPr/>
           <p:nvPr/>
         </p:nvCxnSpPr>
         <p:spPr>
-          <a:xfrm>
-            <a:off x="6613993" y="5281546"/>
-            <a:ext cx="71140" cy="57375"/>
-          </a:xfrm>
-          <a:prstGeom prst="curvedConnector3">
-            <a:avLst>
-              <a:gd name="adj1" fmla="val 422182"/>
-            </a:avLst>
-          </a:prstGeom>
-          <a:ln>
-            <a:tailEnd type="triangle" w="sm" len="sm"/>
-          </a:ln>
-        </p:spPr>
-        <p:style>
-          <a:lnRef idx="1">
-            <a:schemeClr val="accent1"/>
-          </a:lnRef>
-          <a:fillRef idx="0">
-            <a:schemeClr val="accent1"/>
-          </a:fillRef>
-          <a:effectRef idx="0">
-            <a:schemeClr val="accent1"/>
-          </a:effectRef>
-          <a:fontRef idx="minor">
-            <a:schemeClr val="tx1"/>
-          </a:fontRef>
-        </p:style>
-      </p:cxnSp>
-      <p:sp>
-        <p:nvSpPr>
-          <p:cNvPr id="102" name="TextBox 101">
-            <a:extLst>
-              <a:ext uri="{FF2B5EF4-FFF2-40B4-BE49-F238E27FC236}">
-                <a16:creationId xmlns:a16="http://schemas.microsoft.com/office/drawing/2014/main" id="{D6B5A2F6-B89E-4AE4-8E72-7214971C7FC1}"/>
-              </a:ext>
-            </a:extLst>
-          </p:cNvPr>
-          <p:cNvSpPr txBox="1"/>
-          <p:nvPr/>
-        </p:nvSpPr>
-        <p:spPr>
-          <a:xfrm>
-            <a:off x="6839939" y="5147773"/>
-            <a:ext cx="1694132" cy="200055"/>
-          </a:xfrm>
-          <a:prstGeom prst="rect">
-            <a:avLst/>
-          </a:prstGeom>
-          <a:noFill/>
-        </p:spPr>
-        <p:txBody>
-          <a:bodyPr wrap="square" rtlCol="0">
-            <a:spAutoFit/>
-          </a:bodyPr>
-          <a:lstStyle/>
-          <a:p>
-            <a:r>
-              <a:rPr lang="en-US" sz="700" dirty="0" err="1">
-                <a:solidFill>
-                  <a:schemeClr val="tx2"/>
-                </a:solidFill>
-              </a:rPr>
-              <a:t>importContacts</a:t>
-            </a:r>
-            <a:r>
-              <a:rPr lang="en-US" sz="700" dirty="0">
-                <a:solidFill>
-                  <a:schemeClr val="tx2"/>
-                </a:solidFill>
-              </a:rPr>
-              <a:t>(connections)</a:t>
-            </a:r>
-            <a:endParaRPr lang="en-SG" sz="700" dirty="0">
-              <a:solidFill>
-                <a:schemeClr val="tx2"/>
-              </a:solidFill>
-            </a:endParaRPr>
-          </a:p>
-        </p:txBody>
-      </p:sp>
-      <p:sp>
-        <p:nvSpPr>
-          <p:cNvPr id="113" name="TextBox 112">
-            <a:extLst>
-              <a:ext uri="{FF2B5EF4-FFF2-40B4-BE49-F238E27FC236}">
-                <a16:creationId xmlns:a16="http://schemas.microsoft.com/office/drawing/2014/main" id="{79C82149-9DE4-46AD-B1D0-0AE1A9F5659D}"/>
-              </a:ext>
-            </a:extLst>
-          </p:cNvPr>
-          <p:cNvSpPr txBox="1"/>
-          <p:nvPr/>
-        </p:nvSpPr>
-        <p:spPr>
-          <a:xfrm>
-            <a:off x="7796376" y="5253795"/>
-            <a:ext cx="814224" cy="200055"/>
-          </a:xfrm>
-          <a:prstGeom prst="rect">
-            <a:avLst/>
-          </a:prstGeom>
-          <a:noFill/>
-        </p:spPr>
-        <p:txBody>
-          <a:bodyPr wrap="square" rtlCol="0">
-            <a:spAutoFit/>
-          </a:bodyPr>
-          <a:lstStyle/>
-          <a:p>
-            <a:r>
-              <a:rPr lang="en-US" sz="700" dirty="0" err="1">
-                <a:solidFill>
-                  <a:schemeClr val="tx2"/>
-                </a:solidFill>
-              </a:rPr>
-              <a:t>addPerson</a:t>
-            </a:r>
-            <a:r>
-              <a:rPr lang="en-US" sz="700" dirty="0">
-                <a:solidFill>
-                  <a:schemeClr val="tx2"/>
-                </a:solidFill>
-              </a:rPr>
-              <a:t>(p)</a:t>
-            </a:r>
-            <a:endParaRPr lang="en-SG" sz="1000" dirty="0">
-              <a:solidFill>
-                <a:schemeClr val="tx2"/>
-              </a:solidFill>
-            </a:endParaRPr>
-          </a:p>
-        </p:txBody>
-      </p:sp>
-      <p:cxnSp>
-        <p:nvCxnSpPr>
-          <p:cNvPr id="114" name="Straight Arrow Connector 113">
-            <a:extLst>
-              <a:ext uri="{FF2B5EF4-FFF2-40B4-BE49-F238E27FC236}">
-                <a16:creationId xmlns:a16="http://schemas.microsoft.com/office/drawing/2014/main" id="{CDD1EA0A-27A3-4B0B-B468-E674C1D6D99A}"/>
-              </a:ext>
-            </a:extLst>
-          </p:cNvPr>
-          <p:cNvCxnSpPr>
-            <a:cxnSpLocks/>
-          </p:cNvCxnSpPr>
-          <p:nvPr/>
-        </p:nvCxnSpPr>
-        <p:spPr>
-          <a:xfrm>
-            <a:off x="6579554" y="5722410"/>
-            <a:ext cx="735646" cy="0"/>
+          <a:xfrm flipV="1">
+            <a:off x="6607525" y="4573406"/>
+            <a:ext cx="1188851" cy="7388"/>
           </a:xfrm>
           <a:prstGeom prst="straightConnector1">
             <a:avLst/>
@@ -6372,22 +6238,56 @@
           </a:fontRef>
         </p:style>
       </p:cxnSp>
-      <p:sp>
-        <p:nvSpPr>
-          <p:cNvPr id="118" name="Rectangle 117">
-            <a:extLst>
-              <a:ext uri="{FF2B5EF4-FFF2-40B4-BE49-F238E27FC236}">
-                <a16:creationId xmlns:a16="http://schemas.microsoft.com/office/drawing/2014/main" id="{AF779FB7-9674-4CE8-96B9-DC34071BFF81}"/>
-              </a:ext>
-            </a:extLst>
-          </p:cNvPr>
+      <p:cxnSp>
+        <p:nvCxnSpPr>
+          <p:cNvPr id="68" name="Straight Arrow Connector 67"/>
+          <p:cNvCxnSpPr>
+            <a:stCxn id="65" idx="2"/>
+          </p:cNvCxnSpPr>
+          <p:nvPr/>
+        </p:nvCxnSpPr>
+        <p:spPr>
+          <a:xfrm>
+            <a:off x="6599872" y="4769448"/>
+            <a:ext cx="1200710" cy="708"/>
+          </a:xfrm>
+          <a:prstGeom prst="straightConnector1">
+            <a:avLst/>
+          </a:prstGeom>
+          <a:ln w="19050">
+            <a:solidFill>
+              <a:srgbClr val="0070C0"/>
+            </a:solidFill>
+            <a:prstDash val="sysDash"/>
+            <a:headEnd type="arrow" w="med" len="med"/>
+            <a:tailEnd type="none" w="med" len="med"/>
+          </a:ln>
+        </p:spPr>
+        <p:style>
+          <a:lnRef idx="1">
+            <a:schemeClr val="accent1"/>
+          </a:lnRef>
+          <a:fillRef idx="0">
+            <a:schemeClr val="accent1"/>
+          </a:fillRef>
+          <a:effectRef idx="0">
+            <a:schemeClr val="accent1"/>
+          </a:effectRef>
+          <a:fontRef idx="minor">
+            <a:schemeClr val="tx1"/>
+          </a:fontRef>
+        </p:style>
+      </p:cxnSp>
+      <p:sp>
+        <p:nvSpPr>
+          <p:cNvPr id="72" name="Rectangle 71"/>
           <p:cNvSpPr/>
           <p:nvPr/>
         </p:nvSpPr>
         <p:spPr>
           <a:xfrm>
-            <a:off x="8034177" y="6111003"/>
-            <a:ext cx="119223" cy="123309"/>
+            <a:off x="7796959" y="4945301"/>
+            <a:ext cx="174929" cy="194980"/>
           </a:xfrm>
           <a:prstGeom prst="rect">
             <a:avLst/>
@@ -6421,28 +6321,60 @@
           <a:lstStyle/>
           <a:p>
             <a:pPr algn="ctr"/>
-            <a:endParaRPr lang="en-SG" sz="1400"/>
+            <a:endParaRPr lang="en-SG" sz="1400">
+              <a:solidFill>
+                <a:schemeClr val="dk1"/>
+              </a:solidFill>
+            </a:endParaRPr>
           </a:p>
         </p:txBody>
       </p:sp>
       <p:cxnSp>
         <p:nvCxnSpPr>
-          <p:cNvPr id="119" name="Straight Arrow Connector 118">
-            <a:extLst>
-              <a:ext uri="{FF2B5EF4-FFF2-40B4-BE49-F238E27FC236}">
-                <a16:creationId xmlns:a16="http://schemas.microsoft.com/office/drawing/2014/main" id="{63222A36-9F70-4403-B5AD-86840ED909BE}"/>
-              </a:ext>
-            </a:extLst>
-          </p:cNvPr>
-          <p:cNvCxnSpPr>
-            <a:cxnSpLocks/>
-          </p:cNvCxnSpPr>
+          <p:cNvPr id="78" name="Straight Arrow Connector 77"/>
+          <p:cNvCxnSpPr/>
           <p:nvPr/>
         </p:nvCxnSpPr>
         <p:spPr>
-          <a:xfrm>
-            <a:off x="6602254" y="6234312"/>
-            <a:ext cx="1434694" cy="0"/>
+          <a:xfrm flipV="1">
+            <a:off x="6607525" y="4951345"/>
+            <a:ext cx="1188851" cy="7388"/>
+          </a:xfrm>
+          <a:prstGeom prst="straightConnector1">
+            <a:avLst/>
+          </a:prstGeom>
+          <a:ln w="19050">
+            <a:solidFill>
+              <a:srgbClr val="0070C0"/>
+            </a:solidFill>
+            <a:tailEnd type="arrow"/>
+          </a:ln>
+        </p:spPr>
+        <p:style>
+          <a:lnRef idx="1">
+            <a:schemeClr val="accent1"/>
+          </a:lnRef>
+          <a:fillRef idx="0">
+            <a:schemeClr val="accent1"/>
+          </a:fillRef>
+          <a:effectRef idx="0">
+            <a:schemeClr val="accent1"/>
+          </a:effectRef>
+          <a:fontRef idx="minor">
+            <a:schemeClr val="tx1"/>
+          </a:fontRef>
+        </p:style>
+      </p:cxnSp>
+      <p:cxnSp>
+        <p:nvCxnSpPr>
+          <p:cNvPr id="85" name="Straight Arrow Connector 84"/>
+          <p:cNvCxnSpPr/>
+          <p:nvPr/>
+        </p:nvCxnSpPr>
+        <p:spPr>
+          <a:xfrm>
+            <a:off x="6592416" y="5125237"/>
+            <a:ext cx="1200710" cy="708"/>
           </a:xfrm>
           <a:prstGeom prst="straightConnector1">
             <a:avLst/>
@@ -6471,6 +6403,39 @@
           </a:fontRef>
         </p:style>
       </p:cxnSp>
+      <p:sp>
+        <p:nvSpPr>
+          <p:cNvPr id="86" name="TextBox 85"/>
+          <p:cNvSpPr txBox="1"/>
+          <p:nvPr/>
+        </p:nvSpPr>
+        <p:spPr>
+          <a:xfrm>
+            <a:off x="7744073" y="5145356"/>
+            <a:ext cx="258404" cy="261610"/>
+          </a:xfrm>
+          <a:prstGeom prst="rect">
+            <a:avLst/>
+          </a:prstGeom>
+          <a:noFill/>
+        </p:spPr>
+        <p:txBody>
+          <a:bodyPr wrap="none" rtlCol="0">
+            <a:spAutoFit/>
+          </a:bodyPr>
+          <a:lstStyle/>
+          <a:p>
+            <a:r>
+              <a:rPr lang="en-SG" sz="1100" dirty="0">
+                <a:solidFill>
+                  <a:srgbClr val="002060"/>
+                </a:solidFill>
+              </a:rPr>
+              <a:t>X</a:t>
+            </a:r>
+          </a:p>
+        </p:txBody>
+      </p:sp>
     </p:spTree>
     <p:extLst>
       <p:ext uri="{BB962C8B-B14F-4D97-AF65-F5344CB8AC3E}">

</xml_diff>